<commit_message>
Added a crop option to the image plugin
</commit_message>
<xml_diff>
--- a/template.pptx
+++ b/template.pptx
@@ -200,7 +200,7 @@
           <a:p>
             <a:fld id="{E7B118ED-BCD0-4E21-BF08-51644D196BEE}" type="datetimeFigureOut">
               <a:rPr lang="en-IN" smtClean="0"/>
-              <a:t>30-03-2023</a:t>
+              <a:t>07-05-2024</a:t>
             </a:fld>
             <a:endParaRPr lang="en-IN"/>
           </a:p>
@@ -599,7 +599,7 @@
           <a:p>
             <a:fld id="{7CCC1023-8BBC-4D4A-9D55-FAC06BB2FC5A}" type="datetimeFigureOut">
               <a:rPr lang="en-IN" smtClean="0"/>
-              <a:t>30-03-2023</a:t>
+              <a:t>07-05-2024</a:t>
             </a:fld>
             <a:endParaRPr lang="en-IN"/>
           </a:p>
@@ -769,7 +769,7 @@
           <a:p>
             <a:fld id="{7CCC1023-8BBC-4D4A-9D55-FAC06BB2FC5A}" type="datetimeFigureOut">
               <a:rPr lang="en-IN" smtClean="0"/>
-              <a:t>30-03-2023</a:t>
+              <a:t>07-05-2024</a:t>
             </a:fld>
             <a:endParaRPr lang="en-IN"/>
           </a:p>
@@ -949,7 +949,7 @@
           <a:p>
             <a:fld id="{7CCC1023-8BBC-4D4A-9D55-FAC06BB2FC5A}" type="datetimeFigureOut">
               <a:rPr lang="en-IN" smtClean="0"/>
-              <a:t>30-03-2023</a:t>
+              <a:t>07-05-2024</a:t>
             </a:fld>
             <a:endParaRPr lang="en-IN"/>
           </a:p>
@@ -1119,7 +1119,7 @@
           <a:p>
             <a:fld id="{7CCC1023-8BBC-4D4A-9D55-FAC06BB2FC5A}" type="datetimeFigureOut">
               <a:rPr lang="en-IN" smtClean="0"/>
-              <a:t>30-03-2023</a:t>
+              <a:t>07-05-2024</a:t>
             </a:fld>
             <a:endParaRPr lang="en-IN"/>
           </a:p>
@@ -1365,7 +1365,7 @@
           <a:p>
             <a:fld id="{7CCC1023-8BBC-4D4A-9D55-FAC06BB2FC5A}" type="datetimeFigureOut">
               <a:rPr lang="en-IN" smtClean="0"/>
-              <a:t>30-03-2023</a:t>
+              <a:t>07-05-2024</a:t>
             </a:fld>
             <a:endParaRPr lang="en-IN"/>
           </a:p>
@@ -1597,7 +1597,7 @@
           <a:p>
             <a:fld id="{7CCC1023-8BBC-4D4A-9D55-FAC06BB2FC5A}" type="datetimeFigureOut">
               <a:rPr lang="en-IN" smtClean="0"/>
-              <a:t>30-03-2023</a:t>
+              <a:t>07-05-2024</a:t>
             </a:fld>
             <a:endParaRPr lang="en-IN"/>
           </a:p>
@@ -1964,7 +1964,7 @@
           <a:p>
             <a:fld id="{7CCC1023-8BBC-4D4A-9D55-FAC06BB2FC5A}" type="datetimeFigureOut">
               <a:rPr lang="en-IN" smtClean="0"/>
-              <a:t>30-03-2023</a:t>
+              <a:t>07-05-2024</a:t>
             </a:fld>
             <a:endParaRPr lang="en-IN"/>
           </a:p>
@@ -2082,7 +2082,7 @@
           <a:p>
             <a:fld id="{7CCC1023-8BBC-4D4A-9D55-FAC06BB2FC5A}" type="datetimeFigureOut">
               <a:rPr lang="en-IN" smtClean="0"/>
-              <a:t>30-03-2023</a:t>
+              <a:t>07-05-2024</a:t>
             </a:fld>
             <a:endParaRPr lang="en-IN"/>
           </a:p>
@@ -2177,7 +2177,7 @@
           <a:p>
             <a:fld id="{7CCC1023-8BBC-4D4A-9D55-FAC06BB2FC5A}" type="datetimeFigureOut">
               <a:rPr lang="en-IN" smtClean="0"/>
-              <a:t>30-03-2023</a:t>
+              <a:t>07-05-2024</a:t>
             </a:fld>
             <a:endParaRPr lang="en-IN"/>
           </a:p>
@@ -2454,7 +2454,7 @@
           <a:p>
             <a:fld id="{7CCC1023-8BBC-4D4A-9D55-FAC06BB2FC5A}" type="datetimeFigureOut">
               <a:rPr lang="en-IN" smtClean="0"/>
-              <a:t>30-03-2023</a:t>
+              <a:t>07-05-2024</a:t>
             </a:fld>
             <a:endParaRPr lang="en-IN"/>
           </a:p>
@@ -2707,7 +2707,7 @@
           <a:p>
             <a:fld id="{7CCC1023-8BBC-4D4A-9D55-FAC06BB2FC5A}" type="datetimeFigureOut">
               <a:rPr lang="en-IN" smtClean="0"/>
-              <a:t>30-03-2023</a:t>
+              <a:t>07-05-2024</a:t>
             </a:fld>
             <a:endParaRPr lang="en-IN"/>
           </a:p>
@@ -2920,7 +2920,7 @@
           <a:p>
             <a:fld id="{7CCC1023-8BBC-4D4A-9D55-FAC06BB2FC5A}" type="datetimeFigureOut">
               <a:rPr lang="en-IN" smtClean="0"/>
-              <a:t>30-03-2023</a:t>
+              <a:t>07-05-2024</a:t>
             </a:fld>
             <a:endParaRPr lang="en-IN"/>
           </a:p>
@@ -3506,7 +3506,23 @@
             </a:r>
             <a:r>
               <a:rPr lang="en-IN" dirty="0" smtClean="0"/>
-              <a:t>()}}}</a:t>
+              <a:t>(</a:t>
+            </a:r>
+            <a:r>
+              <a:rPr lang="en-001" dirty="0" smtClean="0"/>
+              <a:t>crop</a:t>
+            </a:r>
+            <a:r>
+              <a:rPr lang="en-001" dirty="0" smtClean="0"/>
+              <a:t>={“top</a:t>
+            </a:r>
+            <a:r>
+              <a:rPr lang="en-001" smtClean="0"/>
+              <a:t>”:0}</a:t>
+            </a:r>
+            <a:r>
+              <a:rPr lang="en-IN" dirty="0" smtClean="0"/>
+              <a:t>)}}}</a:t>
             </a:r>
             <a:endParaRPr lang="en-IN" dirty="0"/>
           </a:p>

</xml_diff>

<commit_message>
Updated template to have multiple variables in a textbox
</commit_message>
<xml_diff>
--- a/template.pptx
+++ b/template.pptx
@@ -200,7 +200,7 @@
           <a:p>
             <a:fld id="{E7B118ED-BCD0-4E21-BF08-51644D196BEE}" type="datetimeFigureOut">
               <a:rPr lang="en-IN" smtClean="0"/>
-              <a:t>07-05-2024</a:t>
+              <a:t>25-10-2024</a:t>
             </a:fld>
             <a:endParaRPr lang="en-IN"/>
           </a:p>
@@ -468,6 +468,111 @@
 </p:notesMaster>
 </file>
 
+<file path=ppt/notesSlides/notesSlide1.xml><?xml version="1.0" encoding="utf-8"?>
+<p:notes xmlns:a="http://schemas.openxmlformats.org/drawingml/2006/main" xmlns:r="http://schemas.openxmlformats.org/officeDocument/2006/relationships" xmlns:p="http://schemas.openxmlformats.org/presentationml/2006/main">
+  <p:cSld>
+    <p:spTree>
+      <p:nvGrpSpPr>
+        <p:cNvPr id="1" name=""/>
+        <p:cNvGrpSpPr/>
+        <p:nvPr/>
+      </p:nvGrpSpPr>
+      <p:grpSpPr>
+        <a:xfrm>
+          <a:off x="0" y="0"/>
+          <a:ext cx="0" cy="0"/>
+          <a:chOff x="0" y="0"/>
+          <a:chExt cx="0" cy="0"/>
+        </a:xfrm>
+      </p:grpSpPr>
+      <p:sp>
+        <p:nvSpPr>
+          <p:cNvPr id="2" name="Slide Image Placeholder 1"/>
+          <p:cNvSpPr>
+            <a:spLocks noGrp="1" noRot="1" noChangeAspect="1"/>
+          </p:cNvSpPr>
+          <p:nvPr>
+            <p:ph type="sldImg"/>
+          </p:nvPr>
+        </p:nvSpPr>
+        <p:spPr/>
+      </p:sp>
+      <p:sp>
+        <p:nvSpPr>
+          <p:cNvPr id="3" name="Notes Placeholder 2"/>
+          <p:cNvSpPr>
+            <a:spLocks noGrp="1"/>
+          </p:cNvSpPr>
+          <p:nvPr>
+            <p:ph type="body" idx="1"/>
+          </p:nvPr>
+        </p:nvSpPr>
+        <p:spPr/>
+        <p:txBody>
+          <a:bodyPr/>
+          <a:lstStyle/>
+          <a:p>
+            <a:r>
+              <a:rPr lang="en-IN" dirty="0" smtClean="0"/>
+              <a:t>```python</a:t>
+            </a:r>
+          </a:p>
+          <a:p>
+            <a:r>
+              <a:rPr lang="en-IN" dirty="0" smtClean="0"/>
+              <a:t>X=1</a:t>
+            </a:r>
+          </a:p>
+          <a:p>
+            <a:r>
+              <a:rPr lang="en-IN" dirty="0" smtClean="0"/>
+              <a:t>Y=10</a:t>
+            </a:r>
+          </a:p>
+          <a:p>
+            <a:r>
+              <a:rPr lang="en-IN" dirty="0" smtClean="0"/>
+              <a:t>```</a:t>
+            </a:r>
+          </a:p>
+        </p:txBody>
+      </p:sp>
+      <p:sp>
+        <p:nvSpPr>
+          <p:cNvPr id="4" name="Slide Number Placeholder 3"/>
+          <p:cNvSpPr>
+            <a:spLocks noGrp="1"/>
+          </p:cNvSpPr>
+          <p:nvPr>
+            <p:ph type="sldNum" sz="quarter" idx="10"/>
+          </p:nvPr>
+        </p:nvSpPr>
+        <p:spPr/>
+        <p:txBody>
+          <a:bodyPr/>
+          <a:lstStyle/>
+          <a:p>
+            <a:fld id="{08F02983-DD8C-4F2D-9773-317E670776A8}" type="slidenum">
+              <a:rPr lang="en-IN" smtClean="0"/>
+              <a:t>1</a:t>
+            </a:fld>
+            <a:endParaRPr lang="en-IN"/>
+          </a:p>
+        </p:txBody>
+      </p:sp>
+    </p:spTree>
+    <p:extLst>
+      <p:ext uri="{BB962C8B-B14F-4D97-AF65-F5344CB8AC3E}">
+        <p14:creationId xmlns:p14="http://schemas.microsoft.com/office/powerpoint/2010/main" val="3145950808"/>
+      </p:ext>
+    </p:extLst>
+  </p:cSld>
+  <p:clrMapOvr>
+    <a:masterClrMapping/>
+  </p:clrMapOvr>
+</p:notes>
+</file>
+
 <file path=ppt/slideLayouts/slideLayout1.xml><?xml version="1.0" encoding="utf-8"?>
 <p:sldLayout xmlns:a="http://schemas.openxmlformats.org/drawingml/2006/main" xmlns:r="http://schemas.openxmlformats.org/officeDocument/2006/relationships" xmlns:p="http://schemas.openxmlformats.org/presentationml/2006/main" type="title" preserve="1">
   <p:cSld name="Title Slide">
@@ -599,7 +704,7 @@
           <a:p>
             <a:fld id="{7CCC1023-8BBC-4D4A-9D55-FAC06BB2FC5A}" type="datetimeFigureOut">
               <a:rPr lang="en-IN" smtClean="0"/>
-              <a:t>07-05-2024</a:t>
+              <a:t>25-10-2024</a:t>
             </a:fld>
             <a:endParaRPr lang="en-IN"/>
           </a:p>
@@ -769,7 +874,7 @@
           <a:p>
             <a:fld id="{7CCC1023-8BBC-4D4A-9D55-FAC06BB2FC5A}" type="datetimeFigureOut">
               <a:rPr lang="en-IN" smtClean="0"/>
-              <a:t>07-05-2024</a:t>
+              <a:t>25-10-2024</a:t>
             </a:fld>
             <a:endParaRPr lang="en-IN"/>
           </a:p>
@@ -949,7 +1054,7 @@
           <a:p>
             <a:fld id="{7CCC1023-8BBC-4D4A-9D55-FAC06BB2FC5A}" type="datetimeFigureOut">
               <a:rPr lang="en-IN" smtClean="0"/>
-              <a:t>07-05-2024</a:t>
+              <a:t>25-10-2024</a:t>
             </a:fld>
             <a:endParaRPr lang="en-IN"/>
           </a:p>
@@ -1119,7 +1224,7 @@
           <a:p>
             <a:fld id="{7CCC1023-8BBC-4D4A-9D55-FAC06BB2FC5A}" type="datetimeFigureOut">
               <a:rPr lang="en-IN" smtClean="0"/>
-              <a:t>07-05-2024</a:t>
+              <a:t>25-10-2024</a:t>
             </a:fld>
             <a:endParaRPr lang="en-IN"/>
           </a:p>
@@ -1365,7 +1470,7 @@
           <a:p>
             <a:fld id="{7CCC1023-8BBC-4D4A-9D55-FAC06BB2FC5A}" type="datetimeFigureOut">
               <a:rPr lang="en-IN" smtClean="0"/>
-              <a:t>07-05-2024</a:t>
+              <a:t>25-10-2024</a:t>
             </a:fld>
             <a:endParaRPr lang="en-IN"/>
           </a:p>
@@ -1597,7 +1702,7 @@
           <a:p>
             <a:fld id="{7CCC1023-8BBC-4D4A-9D55-FAC06BB2FC5A}" type="datetimeFigureOut">
               <a:rPr lang="en-IN" smtClean="0"/>
-              <a:t>07-05-2024</a:t>
+              <a:t>25-10-2024</a:t>
             </a:fld>
             <a:endParaRPr lang="en-IN"/>
           </a:p>
@@ -1964,7 +2069,7 @@
           <a:p>
             <a:fld id="{7CCC1023-8BBC-4D4A-9D55-FAC06BB2FC5A}" type="datetimeFigureOut">
               <a:rPr lang="en-IN" smtClean="0"/>
-              <a:t>07-05-2024</a:t>
+              <a:t>25-10-2024</a:t>
             </a:fld>
             <a:endParaRPr lang="en-IN"/>
           </a:p>
@@ -2082,7 +2187,7 @@
           <a:p>
             <a:fld id="{7CCC1023-8BBC-4D4A-9D55-FAC06BB2FC5A}" type="datetimeFigureOut">
               <a:rPr lang="en-IN" smtClean="0"/>
-              <a:t>07-05-2024</a:t>
+              <a:t>25-10-2024</a:t>
             </a:fld>
             <a:endParaRPr lang="en-IN"/>
           </a:p>
@@ -2177,7 +2282,7 @@
           <a:p>
             <a:fld id="{7CCC1023-8BBC-4D4A-9D55-FAC06BB2FC5A}" type="datetimeFigureOut">
               <a:rPr lang="en-IN" smtClean="0"/>
-              <a:t>07-05-2024</a:t>
+              <a:t>25-10-2024</a:t>
             </a:fld>
             <a:endParaRPr lang="en-IN"/>
           </a:p>
@@ -2454,7 +2559,7 @@
           <a:p>
             <a:fld id="{7CCC1023-8BBC-4D4A-9D55-FAC06BB2FC5A}" type="datetimeFigureOut">
               <a:rPr lang="en-IN" smtClean="0"/>
-              <a:t>07-05-2024</a:t>
+              <a:t>25-10-2024</a:t>
             </a:fld>
             <a:endParaRPr lang="en-IN"/>
           </a:p>
@@ -2707,7 +2812,7 @@
           <a:p>
             <a:fld id="{7CCC1023-8BBC-4D4A-9D55-FAC06BB2FC5A}" type="datetimeFigureOut">
               <a:rPr lang="en-IN" smtClean="0"/>
-              <a:t>07-05-2024</a:t>
+              <a:t>25-10-2024</a:t>
             </a:fld>
             <a:endParaRPr lang="en-IN"/>
           </a:p>
@@ -2920,7 +3025,7 @@
           <a:p>
             <a:fld id="{7CCC1023-8BBC-4D4A-9D55-FAC06BB2FC5A}" type="datetimeFigureOut">
               <a:rPr lang="en-IN" smtClean="0"/>
-              <a:t>07-05-2024</a:t>
+              <a:t>25-10-2024</a:t>
             </a:fld>
             <a:endParaRPr lang="en-IN"/>
           </a:p>
@@ -3510,11 +3615,7 @@
             </a:r>
             <a:r>
               <a:rPr lang="en-001" dirty="0" smtClean="0"/>
-              <a:t>crop</a:t>
-            </a:r>
-            <a:r>
-              <a:rPr lang="en-001" dirty="0" smtClean="0"/>
-              <a:t>={“top</a:t>
+              <a:t>crop={“top</a:t>
             </a:r>
             <a:r>
               <a:rPr lang="en-001" smtClean="0"/>
@@ -3529,6 +3630,40 @@
           <a:p>
             <a:pPr algn="ctr"/>
             <a:endParaRPr lang="en-IN" dirty="0"/>
+          </a:p>
+        </p:txBody>
+      </p:sp>
+      <p:sp>
+        <p:nvSpPr>
+          <p:cNvPr id="2" name="TextBox 1"/>
+          <p:cNvSpPr txBox="1"/>
+          <p:nvPr/>
+        </p:nvSpPr>
+        <p:spPr>
+          <a:xfrm>
+            <a:off x="387927" y="6296891"/>
+            <a:ext cx="10778837" cy="369332"/>
+          </a:xfrm>
+          <a:prstGeom prst="rect">
+            <a:avLst/>
+          </a:prstGeom>
+          <a:noFill/>
+        </p:spPr>
+        <p:txBody>
+          <a:bodyPr wrap="square" rtlCol="0">
+            <a:spAutoFit/>
+          </a:bodyPr>
+          <a:lstStyle/>
+          <a:p>
+            <a:r>
+              <a:rPr lang="en-IN" dirty="0" smtClean="0"/>
+              <a:t>The value of X is {{{X}}} and the value of </a:t>
+            </a:r>
+            <a:r>
+              <a:rPr lang="en-IN" smtClean="0"/>
+              <a:t>Y is {{{Y}}}.</a:t>
+            </a:r>
+            <a:endParaRPr lang="en-IN"/>
           </a:p>
         </p:txBody>
       </p:sp>

</xml_diff>

<commit_message>
Bugfix/multiple variables in box (#12)
* Used non-greedy operator

* Bump version to 0.4.1

* Updated template to have multiple variables in a textbox

* Update python-pytest.yml to include additional Python versions

* Added test to check if multi variables are rendering properly
</commit_message>
<xml_diff>
--- a/template.pptx
+++ b/template.pptx
@@ -200,7 +200,7 @@
           <a:p>
             <a:fld id="{E7B118ED-BCD0-4E21-BF08-51644D196BEE}" type="datetimeFigureOut">
               <a:rPr lang="en-IN" smtClean="0"/>
-              <a:t>07-05-2024</a:t>
+              <a:t>25-10-2024</a:t>
             </a:fld>
             <a:endParaRPr lang="en-IN"/>
           </a:p>
@@ -468,6 +468,111 @@
 </p:notesMaster>
 </file>
 
+<file path=ppt/notesSlides/notesSlide1.xml><?xml version="1.0" encoding="utf-8"?>
+<p:notes xmlns:a="http://schemas.openxmlformats.org/drawingml/2006/main" xmlns:r="http://schemas.openxmlformats.org/officeDocument/2006/relationships" xmlns:p="http://schemas.openxmlformats.org/presentationml/2006/main">
+  <p:cSld>
+    <p:spTree>
+      <p:nvGrpSpPr>
+        <p:cNvPr id="1" name=""/>
+        <p:cNvGrpSpPr/>
+        <p:nvPr/>
+      </p:nvGrpSpPr>
+      <p:grpSpPr>
+        <a:xfrm>
+          <a:off x="0" y="0"/>
+          <a:ext cx="0" cy="0"/>
+          <a:chOff x="0" y="0"/>
+          <a:chExt cx="0" cy="0"/>
+        </a:xfrm>
+      </p:grpSpPr>
+      <p:sp>
+        <p:nvSpPr>
+          <p:cNvPr id="2" name="Slide Image Placeholder 1"/>
+          <p:cNvSpPr>
+            <a:spLocks noGrp="1" noRot="1" noChangeAspect="1"/>
+          </p:cNvSpPr>
+          <p:nvPr>
+            <p:ph type="sldImg"/>
+          </p:nvPr>
+        </p:nvSpPr>
+        <p:spPr/>
+      </p:sp>
+      <p:sp>
+        <p:nvSpPr>
+          <p:cNvPr id="3" name="Notes Placeholder 2"/>
+          <p:cNvSpPr>
+            <a:spLocks noGrp="1"/>
+          </p:cNvSpPr>
+          <p:nvPr>
+            <p:ph type="body" idx="1"/>
+          </p:nvPr>
+        </p:nvSpPr>
+        <p:spPr/>
+        <p:txBody>
+          <a:bodyPr/>
+          <a:lstStyle/>
+          <a:p>
+            <a:r>
+              <a:rPr lang="en-IN" dirty="0" smtClean="0"/>
+              <a:t>```python</a:t>
+            </a:r>
+          </a:p>
+          <a:p>
+            <a:r>
+              <a:rPr lang="en-IN" dirty="0" smtClean="0"/>
+              <a:t>X=1</a:t>
+            </a:r>
+          </a:p>
+          <a:p>
+            <a:r>
+              <a:rPr lang="en-IN" dirty="0" smtClean="0"/>
+              <a:t>Y=10</a:t>
+            </a:r>
+          </a:p>
+          <a:p>
+            <a:r>
+              <a:rPr lang="en-IN" dirty="0" smtClean="0"/>
+              <a:t>```</a:t>
+            </a:r>
+          </a:p>
+        </p:txBody>
+      </p:sp>
+      <p:sp>
+        <p:nvSpPr>
+          <p:cNvPr id="4" name="Slide Number Placeholder 3"/>
+          <p:cNvSpPr>
+            <a:spLocks noGrp="1"/>
+          </p:cNvSpPr>
+          <p:nvPr>
+            <p:ph type="sldNum" sz="quarter" idx="10"/>
+          </p:nvPr>
+        </p:nvSpPr>
+        <p:spPr/>
+        <p:txBody>
+          <a:bodyPr/>
+          <a:lstStyle/>
+          <a:p>
+            <a:fld id="{08F02983-DD8C-4F2D-9773-317E670776A8}" type="slidenum">
+              <a:rPr lang="en-IN" smtClean="0"/>
+              <a:t>1</a:t>
+            </a:fld>
+            <a:endParaRPr lang="en-IN"/>
+          </a:p>
+        </p:txBody>
+      </p:sp>
+    </p:spTree>
+    <p:extLst>
+      <p:ext uri="{BB962C8B-B14F-4D97-AF65-F5344CB8AC3E}">
+        <p14:creationId xmlns:p14="http://schemas.microsoft.com/office/powerpoint/2010/main" val="3145950808"/>
+      </p:ext>
+    </p:extLst>
+  </p:cSld>
+  <p:clrMapOvr>
+    <a:masterClrMapping/>
+  </p:clrMapOvr>
+</p:notes>
+</file>
+
 <file path=ppt/slideLayouts/slideLayout1.xml><?xml version="1.0" encoding="utf-8"?>
 <p:sldLayout xmlns:a="http://schemas.openxmlformats.org/drawingml/2006/main" xmlns:r="http://schemas.openxmlformats.org/officeDocument/2006/relationships" xmlns:p="http://schemas.openxmlformats.org/presentationml/2006/main" type="title" preserve="1">
   <p:cSld name="Title Slide">
@@ -599,7 +704,7 @@
           <a:p>
             <a:fld id="{7CCC1023-8BBC-4D4A-9D55-FAC06BB2FC5A}" type="datetimeFigureOut">
               <a:rPr lang="en-IN" smtClean="0"/>
-              <a:t>07-05-2024</a:t>
+              <a:t>25-10-2024</a:t>
             </a:fld>
             <a:endParaRPr lang="en-IN"/>
           </a:p>
@@ -769,7 +874,7 @@
           <a:p>
             <a:fld id="{7CCC1023-8BBC-4D4A-9D55-FAC06BB2FC5A}" type="datetimeFigureOut">
               <a:rPr lang="en-IN" smtClean="0"/>
-              <a:t>07-05-2024</a:t>
+              <a:t>25-10-2024</a:t>
             </a:fld>
             <a:endParaRPr lang="en-IN"/>
           </a:p>
@@ -949,7 +1054,7 @@
           <a:p>
             <a:fld id="{7CCC1023-8BBC-4D4A-9D55-FAC06BB2FC5A}" type="datetimeFigureOut">
               <a:rPr lang="en-IN" smtClean="0"/>
-              <a:t>07-05-2024</a:t>
+              <a:t>25-10-2024</a:t>
             </a:fld>
             <a:endParaRPr lang="en-IN"/>
           </a:p>
@@ -1119,7 +1224,7 @@
           <a:p>
             <a:fld id="{7CCC1023-8BBC-4D4A-9D55-FAC06BB2FC5A}" type="datetimeFigureOut">
               <a:rPr lang="en-IN" smtClean="0"/>
-              <a:t>07-05-2024</a:t>
+              <a:t>25-10-2024</a:t>
             </a:fld>
             <a:endParaRPr lang="en-IN"/>
           </a:p>
@@ -1365,7 +1470,7 @@
           <a:p>
             <a:fld id="{7CCC1023-8BBC-4D4A-9D55-FAC06BB2FC5A}" type="datetimeFigureOut">
               <a:rPr lang="en-IN" smtClean="0"/>
-              <a:t>07-05-2024</a:t>
+              <a:t>25-10-2024</a:t>
             </a:fld>
             <a:endParaRPr lang="en-IN"/>
           </a:p>
@@ -1597,7 +1702,7 @@
           <a:p>
             <a:fld id="{7CCC1023-8BBC-4D4A-9D55-FAC06BB2FC5A}" type="datetimeFigureOut">
               <a:rPr lang="en-IN" smtClean="0"/>
-              <a:t>07-05-2024</a:t>
+              <a:t>25-10-2024</a:t>
             </a:fld>
             <a:endParaRPr lang="en-IN"/>
           </a:p>
@@ -1964,7 +2069,7 @@
           <a:p>
             <a:fld id="{7CCC1023-8BBC-4D4A-9D55-FAC06BB2FC5A}" type="datetimeFigureOut">
               <a:rPr lang="en-IN" smtClean="0"/>
-              <a:t>07-05-2024</a:t>
+              <a:t>25-10-2024</a:t>
             </a:fld>
             <a:endParaRPr lang="en-IN"/>
           </a:p>
@@ -2082,7 +2187,7 @@
           <a:p>
             <a:fld id="{7CCC1023-8BBC-4D4A-9D55-FAC06BB2FC5A}" type="datetimeFigureOut">
               <a:rPr lang="en-IN" smtClean="0"/>
-              <a:t>07-05-2024</a:t>
+              <a:t>25-10-2024</a:t>
             </a:fld>
             <a:endParaRPr lang="en-IN"/>
           </a:p>
@@ -2177,7 +2282,7 @@
           <a:p>
             <a:fld id="{7CCC1023-8BBC-4D4A-9D55-FAC06BB2FC5A}" type="datetimeFigureOut">
               <a:rPr lang="en-IN" smtClean="0"/>
-              <a:t>07-05-2024</a:t>
+              <a:t>25-10-2024</a:t>
             </a:fld>
             <a:endParaRPr lang="en-IN"/>
           </a:p>
@@ -2454,7 +2559,7 @@
           <a:p>
             <a:fld id="{7CCC1023-8BBC-4D4A-9D55-FAC06BB2FC5A}" type="datetimeFigureOut">
               <a:rPr lang="en-IN" smtClean="0"/>
-              <a:t>07-05-2024</a:t>
+              <a:t>25-10-2024</a:t>
             </a:fld>
             <a:endParaRPr lang="en-IN"/>
           </a:p>
@@ -2707,7 +2812,7 @@
           <a:p>
             <a:fld id="{7CCC1023-8BBC-4D4A-9D55-FAC06BB2FC5A}" type="datetimeFigureOut">
               <a:rPr lang="en-IN" smtClean="0"/>
-              <a:t>07-05-2024</a:t>
+              <a:t>25-10-2024</a:t>
             </a:fld>
             <a:endParaRPr lang="en-IN"/>
           </a:p>
@@ -2920,7 +3025,7 @@
           <a:p>
             <a:fld id="{7CCC1023-8BBC-4D4A-9D55-FAC06BB2FC5A}" type="datetimeFigureOut">
               <a:rPr lang="en-IN" smtClean="0"/>
-              <a:t>07-05-2024</a:t>
+              <a:t>25-10-2024</a:t>
             </a:fld>
             <a:endParaRPr lang="en-IN"/>
           </a:p>
@@ -3510,11 +3615,7 @@
             </a:r>
             <a:r>
               <a:rPr lang="en-001" dirty="0" smtClean="0"/>
-              <a:t>crop</a:t>
-            </a:r>
-            <a:r>
-              <a:rPr lang="en-001" dirty="0" smtClean="0"/>
-              <a:t>={“top</a:t>
+              <a:t>crop={“top</a:t>
             </a:r>
             <a:r>
               <a:rPr lang="en-001" smtClean="0"/>
@@ -3529,6 +3630,40 @@
           <a:p>
             <a:pPr algn="ctr"/>
             <a:endParaRPr lang="en-IN" dirty="0"/>
+          </a:p>
+        </p:txBody>
+      </p:sp>
+      <p:sp>
+        <p:nvSpPr>
+          <p:cNvPr id="2" name="TextBox 1"/>
+          <p:cNvSpPr txBox="1"/>
+          <p:nvPr/>
+        </p:nvSpPr>
+        <p:spPr>
+          <a:xfrm>
+            <a:off x="387927" y="6296891"/>
+            <a:ext cx="10778837" cy="369332"/>
+          </a:xfrm>
+          <a:prstGeom prst="rect">
+            <a:avLst/>
+          </a:prstGeom>
+          <a:noFill/>
+        </p:spPr>
+        <p:txBody>
+          <a:bodyPr wrap="square" rtlCol="0">
+            <a:spAutoFit/>
+          </a:bodyPr>
+          <a:lstStyle/>
+          <a:p>
+            <a:r>
+              <a:rPr lang="en-IN" dirty="0" smtClean="0"/>
+              <a:t>The value of X is {{{X}}} and the value of </a:t>
+            </a:r>
+            <a:r>
+              <a:rPr lang="en-IN" smtClean="0"/>
+              <a:t>Y is {{{Y}}}.</a:t>
+            </a:r>
+            <a:endParaRPr lang="en-IN"/>
           </a:p>
         </p:txBody>
       </p:sp>

</xml_diff>